<commit_message>
finished this weeks presentation
</commit_message>
<xml_diff>
--- a/weekly_presenations/frag.extract_06.05.19.pptx
+++ b/weekly_presenations/frag.extract_06.05.19.pptx
@@ -5,8 +5,10 @@
     <p:sldMasterId id="2147483648" r:id="rId1"/>
   </p:sldMasterIdLst>
   <p:sldIdLst>
-    <p:sldId id="256" r:id="rId2"/>
-    <p:sldId id="257" r:id="rId3"/>
+    <p:sldId id="258" r:id="rId2"/>
+    <p:sldId id="256" r:id="rId3"/>
+    <p:sldId id="257" r:id="rId4"/>
+    <p:sldId id="259" r:id="rId5"/>
   </p:sldIdLst>
   <p:sldSz cx="12192000" cy="6858000"/>
   <p:notesSz cx="6858000" cy="9144000"/>
@@ -105,6 +107,11 @@
       </a:defRPr>
     </a:lvl9pPr>
   </p:defaultTextStyle>
+  <p:extLst>
+    <p:ext uri="{EFAFB233-063F-42B5-8137-9DF3F51BA10A}">
+      <p15:sldGuideLst xmlns:p15="http://schemas.microsoft.com/office/powerpoint/2012/main"/>
+    </p:ext>
+  </p:extLst>
 </p:presentation>
 </file>
 
@@ -3327,83 +3334,77 @@
           <p:cNvPr id="4" name="Titel 3">
             <a:extLst>
               <a:ext uri="{FF2B5EF4-FFF2-40B4-BE49-F238E27FC236}">
-                <a16:creationId xmlns:a16="http://schemas.microsoft.com/office/drawing/2014/main" id="{30615174-22B6-40ED-958E-25FD157B0945}"/>
-              </a:ext>
-            </a:extLst>
-          </p:cNvPr>
-          <p:cNvSpPr>
-            <a:spLocks noGrp="1"/>
-          </p:cNvSpPr>
-          <p:nvPr>
-            <p:ph type="title"/>
-          </p:nvPr>
-        </p:nvSpPr>
-        <p:spPr/>
-        <p:txBody>
-          <a:bodyPr/>
-          <a:lstStyle/>
-          <a:p>
-            <a:r>
-              <a:rPr lang="de-DE" dirty="0"/>
-              <a:t>Chrome Extension – neue Probleme</a:t>
-            </a:r>
-          </a:p>
-        </p:txBody>
-      </p:sp>
-      <p:sp>
-        <p:nvSpPr>
-          <p:cNvPr id="5" name="Inhaltsplatzhalter 4">
-            <a:extLst>
-              <a:ext uri="{FF2B5EF4-FFF2-40B4-BE49-F238E27FC236}">
-                <a16:creationId xmlns:a16="http://schemas.microsoft.com/office/drawing/2014/main" id="{07A443D6-22FF-4227-8D89-04CBDF6FC83D}"/>
-              </a:ext>
-            </a:extLst>
-          </p:cNvPr>
-          <p:cNvSpPr>
-            <a:spLocks noGrp="1"/>
-          </p:cNvSpPr>
-          <p:nvPr>
-            <p:ph idx="1"/>
-          </p:nvPr>
-        </p:nvSpPr>
-        <p:spPr/>
-        <p:txBody>
-          <a:bodyPr>
-            <a:normAutofit/>
-          </a:bodyPr>
-          <a:lstStyle/>
-          <a:p>
-            <a:r>
-              <a:rPr lang="de-DE" dirty="0"/>
-              <a:t>Nicht geeignet für Dateisystem-Zugriff, mögliche Lösungen:</a:t>
-            </a:r>
-          </a:p>
-          <a:p>
-            <a:pPr marL="971550" lvl="1" indent="-514350">
-              <a:buFont typeface="+mj-lt"/>
-              <a:buAutoNum type="alphaLcPeriod"/>
-            </a:pPr>
-            <a:r>
-              <a:rPr lang="de-DE" dirty="0"/>
-              <a:t>Kommunikation mit VS Code Extension über Chromes Native Messaging API, VS Code Extension übernimmt Hinzufügen der Fragmente als Snippets zu VS Code (unklar, ob das geht)</a:t>
-            </a:r>
-          </a:p>
-          <a:p>
-            <a:pPr marL="971550" lvl="1" indent="-514350">
-              <a:buFont typeface="+mj-lt"/>
-              <a:buAutoNum type="alphaLcPeriod"/>
-            </a:pPr>
-            <a:r>
-              <a:rPr lang="de-DE" dirty="0"/>
-              <a:t>Chrome Extension ist nur ein Button, der per Klick externes Programm startet, dieses übernimmt alle weiteren Funktionen (Fragment extrahieren, editieren lassen durch User, zu VS Code Snippets hinzufügen)</a:t>
-            </a:r>
+                <a16:creationId xmlns:a16="http://schemas.microsoft.com/office/drawing/2014/main" id="{0562C7CF-627F-442D-A21E-842BD901B8AD}"/>
+              </a:ext>
+            </a:extLst>
+          </p:cNvPr>
+          <p:cNvSpPr>
+            <a:spLocks noGrp="1"/>
+          </p:cNvSpPr>
+          <p:nvPr>
+            <p:ph type="ctrTitle"/>
+          </p:nvPr>
+        </p:nvSpPr>
+        <p:spPr/>
+        <p:txBody>
+          <a:bodyPr/>
+          <a:lstStyle/>
+          <a:p>
+            <a:r>
+              <a:rPr lang="en-GB"/>
+              <a:t>frag.extract</a:t>
+            </a:r>
+            <a:endParaRPr lang="de-DE"/>
+          </a:p>
+        </p:txBody>
+      </p:sp>
+      <p:sp>
+        <p:nvSpPr>
+          <p:cNvPr id="5" name="Untertitel 4">
+            <a:extLst>
+              <a:ext uri="{FF2B5EF4-FFF2-40B4-BE49-F238E27FC236}">
+                <a16:creationId xmlns:a16="http://schemas.microsoft.com/office/drawing/2014/main" id="{D20CBC9E-0B85-40E3-9D33-0FED18CBB4ED}"/>
+              </a:ext>
+            </a:extLst>
+          </p:cNvPr>
+          <p:cNvSpPr>
+            <a:spLocks noGrp="1"/>
+          </p:cNvSpPr>
+          <p:nvPr>
+            <p:ph type="subTitle" idx="1"/>
+          </p:nvPr>
+        </p:nvSpPr>
+        <p:spPr/>
+        <p:txBody>
+          <a:bodyPr/>
+          <a:lstStyle/>
+          <a:p>
+            <a:r>
+              <a:rPr lang="en-GB">
+                <a:solidFill>
+                  <a:schemeClr val="tx1">
+                    <a:lumMod val="50000"/>
+                    <a:lumOff val="50000"/>
+                  </a:schemeClr>
+                </a:solidFill>
+              </a:rPr>
+              <a:t>06.05.2019</a:t>
+            </a:r>
+            <a:endParaRPr lang="de-DE">
+              <a:solidFill>
+                <a:schemeClr val="tx1">
+                  <a:lumMod val="50000"/>
+                  <a:lumOff val="50000"/>
+                </a:schemeClr>
+              </a:solidFill>
+            </a:endParaRPr>
           </a:p>
         </p:txBody>
       </p:sp>
     </p:spTree>
     <p:extLst>
       <p:ext uri="{BB962C8B-B14F-4D97-AF65-F5344CB8AC3E}">
-        <p14:creationId xmlns:p14="http://schemas.microsoft.com/office/powerpoint/2010/main" val="1566625658"/>
+        <p14:creationId xmlns:p14="http://schemas.microsoft.com/office/powerpoint/2010/main" val="3156059431"/>
       </p:ext>
     </p:extLst>
   </p:cSld>
@@ -3432,6 +3433,114 @@
       </p:grpSpPr>
       <p:sp>
         <p:nvSpPr>
+          <p:cNvPr id="4" name="Titel 3">
+            <a:extLst>
+              <a:ext uri="{FF2B5EF4-FFF2-40B4-BE49-F238E27FC236}">
+                <a16:creationId xmlns:a16="http://schemas.microsoft.com/office/drawing/2014/main" id="{30615174-22B6-40ED-958E-25FD157B0945}"/>
+              </a:ext>
+            </a:extLst>
+          </p:cNvPr>
+          <p:cNvSpPr>
+            <a:spLocks noGrp="1"/>
+          </p:cNvSpPr>
+          <p:nvPr>
+            <p:ph type="title"/>
+          </p:nvPr>
+        </p:nvSpPr>
+        <p:spPr/>
+        <p:txBody>
+          <a:bodyPr/>
+          <a:lstStyle/>
+          <a:p>
+            <a:r>
+              <a:rPr lang="de-DE" dirty="0"/>
+              <a:t>Chrome Extension – neue Probleme</a:t>
+            </a:r>
+          </a:p>
+        </p:txBody>
+      </p:sp>
+      <p:sp>
+        <p:nvSpPr>
+          <p:cNvPr id="5" name="Inhaltsplatzhalter 4">
+            <a:extLst>
+              <a:ext uri="{FF2B5EF4-FFF2-40B4-BE49-F238E27FC236}">
+                <a16:creationId xmlns:a16="http://schemas.microsoft.com/office/drawing/2014/main" id="{07A443D6-22FF-4227-8D89-04CBDF6FC83D}"/>
+              </a:ext>
+            </a:extLst>
+          </p:cNvPr>
+          <p:cNvSpPr>
+            <a:spLocks noGrp="1"/>
+          </p:cNvSpPr>
+          <p:nvPr>
+            <p:ph idx="1"/>
+          </p:nvPr>
+        </p:nvSpPr>
+        <p:spPr/>
+        <p:txBody>
+          <a:bodyPr>
+            <a:normAutofit/>
+          </a:bodyPr>
+          <a:lstStyle/>
+          <a:p>
+            <a:r>
+              <a:rPr lang="de-DE" dirty="0"/>
+              <a:t>Nicht geeignet für Dateisystem-Zugriff, mögliche Lösungen:</a:t>
+            </a:r>
+          </a:p>
+          <a:p>
+            <a:pPr marL="971550" lvl="1" indent="-514350">
+              <a:buFont typeface="+mj-lt"/>
+              <a:buAutoNum type="alphaLcPeriod"/>
+            </a:pPr>
+            <a:r>
+              <a:rPr lang="de-DE" dirty="0"/>
+              <a:t>Kommunikation mit VS Code Extension über Chromes Native Messaging API, VS Code Extension übernimmt Hinzufügen der Fragmente als Snippets zu VS Code (unklar, ob das geht)</a:t>
+            </a:r>
+          </a:p>
+          <a:p>
+            <a:pPr marL="971550" lvl="1" indent="-514350">
+              <a:buFont typeface="+mj-lt"/>
+              <a:buAutoNum type="alphaLcPeriod"/>
+            </a:pPr>
+            <a:r>
+              <a:rPr lang="de-DE" dirty="0"/>
+              <a:t>Chrome Extension ist nur ein Button, der per Klick externes Programm startet, dieses übernimmt alle weiteren Funktionen (Fragment extrahieren, editieren lassen durch User, zu VS Code Snippets hinzufügen)</a:t>
+            </a:r>
+          </a:p>
+        </p:txBody>
+      </p:sp>
+    </p:spTree>
+    <p:extLst>
+      <p:ext uri="{BB962C8B-B14F-4D97-AF65-F5344CB8AC3E}">
+        <p14:creationId xmlns:p14="http://schemas.microsoft.com/office/powerpoint/2010/main" val="1566625658"/>
+      </p:ext>
+    </p:extLst>
+  </p:cSld>
+  <p:clrMapOvr>
+    <a:masterClrMapping/>
+  </p:clrMapOvr>
+</p:sld>
+</file>
+
+<file path=ppt/slides/slide3.xml><?xml version="1.0" encoding="utf-8"?>
+<p:sld xmlns:a="http://schemas.openxmlformats.org/drawingml/2006/main" xmlns:r="http://schemas.openxmlformats.org/officeDocument/2006/relationships" xmlns:p="http://schemas.openxmlformats.org/presentationml/2006/main">
+  <p:cSld>
+    <p:spTree>
+      <p:nvGrpSpPr>
+        <p:cNvPr id="1" name=""/>
+        <p:cNvGrpSpPr/>
+        <p:nvPr/>
+      </p:nvGrpSpPr>
+      <p:grpSpPr>
+        <a:xfrm>
+          <a:off x="0" y="0"/>
+          <a:ext cx="0" cy="0"/>
+          <a:chOff x="0" y="0"/>
+          <a:chExt cx="0" cy="0"/>
+        </a:xfrm>
+      </p:grpSpPr>
+      <p:sp>
+        <p:nvSpPr>
           <p:cNvPr id="2" name="Titel 1">
             <a:extLst>
               <a:ext uri="{FF2B5EF4-FFF2-40B4-BE49-F238E27FC236}">
@@ -3520,6 +3629,125 @@
     <p:extLst>
       <p:ext uri="{BB962C8B-B14F-4D97-AF65-F5344CB8AC3E}">
         <p14:creationId xmlns:p14="http://schemas.microsoft.com/office/powerpoint/2010/main" val="3925194270"/>
+      </p:ext>
+    </p:extLst>
+  </p:cSld>
+  <p:clrMapOvr>
+    <a:masterClrMapping/>
+  </p:clrMapOvr>
+</p:sld>
+</file>
+
+<file path=ppt/slides/slide4.xml><?xml version="1.0" encoding="utf-8"?>
+<p:sld xmlns:a="http://schemas.openxmlformats.org/drawingml/2006/main" xmlns:r="http://schemas.openxmlformats.org/officeDocument/2006/relationships" xmlns:p="http://schemas.openxmlformats.org/presentationml/2006/main">
+  <p:cSld>
+    <p:spTree>
+      <p:nvGrpSpPr>
+        <p:cNvPr id="1" name=""/>
+        <p:cNvGrpSpPr/>
+        <p:nvPr/>
+      </p:nvGrpSpPr>
+      <p:grpSpPr>
+        <a:xfrm>
+          <a:off x="0" y="0"/>
+          <a:ext cx="0" cy="0"/>
+          <a:chOff x="0" y="0"/>
+          <a:chExt cx="0" cy="0"/>
+        </a:xfrm>
+      </p:grpSpPr>
+      <p:sp>
+        <p:nvSpPr>
+          <p:cNvPr id="2" name="Titel 1">
+            <a:extLst>
+              <a:ext uri="{FF2B5EF4-FFF2-40B4-BE49-F238E27FC236}">
+                <a16:creationId xmlns:a16="http://schemas.microsoft.com/office/drawing/2014/main" id="{685A5C36-11B2-4686-96CD-D6ABF0E5E4FC}"/>
+              </a:ext>
+            </a:extLst>
+          </p:cNvPr>
+          <p:cNvSpPr>
+            <a:spLocks noGrp="1"/>
+          </p:cNvSpPr>
+          <p:nvPr>
+            <p:ph type="title"/>
+          </p:nvPr>
+        </p:nvSpPr>
+        <p:spPr/>
+        <p:txBody>
+          <a:bodyPr/>
+          <a:lstStyle/>
+          <a:p>
+            <a:r>
+              <a:rPr lang="en-GB"/>
+              <a:t>Extraktionsprozess - Probleme</a:t>
+            </a:r>
+            <a:endParaRPr lang="de-DE"/>
+          </a:p>
+        </p:txBody>
+      </p:sp>
+      <p:sp>
+        <p:nvSpPr>
+          <p:cNvPr id="3" name="Inhaltsplatzhalter 2">
+            <a:extLst>
+              <a:ext uri="{FF2B5EF4-FFF2-40B4-BE49-F238E27FC236}">
+                <a16:creationId xmlns:a16="http://schemas.microsoft.com/office/drawing/2014/main" id="{D14BE118-B98A-486C-BDDC-8FCACE591DDE}"/>
+              </a:ext>
+            </a:extLst>
+          </p:cNvPr>
+          <p:cNvSpPr>
+            <a:spLocks noGrp="1"/>
+          </p:cNvSpPr>
+          <p:nvPr>
+            <p:ph idx="1"/>
+          </p:nvPr>
+        </p:nvSpPr>
+        <p:spPr/>
+        <p:txBody>
+          <a:bodyPr/>
+          <a:lstStyle/>
+          <a:p>
+            <a:r>
+              <a:rPr lang="en-US"/>
+              <a:t>CoNaLa-Corpus: very small Dataset in high quality</a:t>
+            </a:r>
+          </a:p>
+          <a:p>
+            <a:r>
+              <a:rPr lang="en-US"/>
+              <a:t>Which model?</a:t>
+            </a:r>
+          </a:p>
+          <a:p>
+            <a:pPr lvl="1"/>
+            <a:r>
+              <a:rPr lang="de-DE"/>
+              <a:t>SVM for small sets</a:t>
+            </a:r>
+          </a:p>
+          <a:p>
+            <a:pPr lvl="1"/>
+            <a:r>
+              <a:rPr lang="de-DE"/>
+              <a:t>Neural Network for Big Data</a:t>
+            </a:r>
+          </a:p>
+          <a:p>
+            <a:r>
+              <a:rPr lang="en-US"/>
+              <a:t>Phrasing of problem is not trivial; theoretically: association/similarity-score between natural language and code</a:t>
+            </a:r>
+          </a:p>
+          <a:p>
+            <a:r>
+              <a:rPr lang="en-US"/>
+              <a:t>Ranking necessary, which is yield by proper problem formulation</a:t>
+            </a:r>
+          </a:p>
+        </p:txBody>
+      </p:sp>
+    </p:spTree>
+    <p:extLst>
+      <p:ext uri="{BB962C8B-B14F-4D97-AF65-F5344CB8AC3E}">
+        <p14:creationId xmlns:p14="http://schemas.microsoft.com/office/powerpoint/2010/main" val="2505165955"/>
       </p:ext>
     </p:extLst>
   </p:cSld>

</xml_diff>